<commit_message>
Update: -Print Feature; -Work Schedule cosmetic change dependant on HR codes. Bug Fix: -Header Title; -When selecting the Work Schedule from the selection menu, Overtime Schedule would appear. Bug squashed and Work Schedule appears on app init
</commit_message>
<xml_diff>
--- a/Schedule App Packaging & Deployment/Picture edits.pptx
+++ b/Schedule App Packaging & Deployment/Picture edits.pptx
@@ -6,9 +6,11 @@
   </p:sldMasterIdLst>
   <p:sldIdLst>
     <p:sldId id="256" r:id="rId2"/>
-    <p:sldId id="257" r:id="rId3"/>
-    <p:sldId id="258" r:id="rId4"/>
-    <p:sldId id="259" r:id="rId5"/>
+    <p:sldId id="260" r:id="rId3"/>
+    <p:sldId id="257" r:id="rId4"/>
+    <p:sldId id="261" r:id="rId5"/>
+    <p:sldId id="258" r:id="rId6"/>
+    <p:sldId id="259" r:id="rId7"/>
   </p:sldIdLst>
   <p:sldSz cx="12192000" cy="6858000"/>
   <p:notesSz cx="6858000" cy="9144000"/>
@@ -113,14 +115,6 @@
     </p:ext>
   </p:extLst>
 </p:presentation>
-</file>
-
-<file path=ppt/revisionInfo.xml><?xml version="1.0" encoding="utf-8"?>
-<p1510:revInfo xmlns:a="http://schemas.openxmlformats.org/drawingml/2006/main" xmlns:r="http://schemas.openxmlformats.org/officeDocument/2006/relationships" xmlns:p1510="http://schemas.microsoft.com/office/powerpoint/2015/10/main">
-  <p1510:revLst>
-    <p1510:client id="{17FCE637-4CCF-4136-AFA7-5BF909704658}" v="5" dt="2024-07-07T07:10:20.341"/>
-  </p1510:revLst>
-</p1510:revInfo>
 </file>
 
 <file path=ppt/changesInfos/changesInfo1.xml><?xml version="1.0" encoding="utf-8"?>
@@ -235,6 +229,68 @@
       </pc:sldChg>
     </pc:docChg>
   </pc:docChgLst>
+  <pc:docChgLst>
+    <pc:chgData name="Matthew Dunaway" userId="ecbf838ef16abdd7" providerId="LiveId" clId="{2D4C39F9-B3DF-480B-87DA-EF751013159C}"/>
+    <pc:docChg chg="custSel addSld modSld">
+      <pc:chgData name="Matthew Dunaway" userId="ecbf838ef16abdd7" providerId="LiveId" clId="{2D4C39F9-B3DF-480B-87DA-EF751013159C}" dt="2024-07-12T09:08:26.203" v="7" actId="478"/>
+      <pc:docMkLst>
+        <pc:docMk/>
+      </pc:docMkLst>
+      <pc:sldChg chg="delSp mod">
+        <pc:chgData name="Matthew Dunaway" userId="ecbf838ef16abdd7" providerId="LiveId" clId="{2D4C39F9-B3DF-480B-87DA-EF751013159C}" dt="2024-07-12T08:59:32.880" v="5" actId="478"/>
+        <pc:sldMkLst>
+          <pc:docMk/>
+          <pc:sldMk cId="1648931339" sldId="257"/>
+        </pc:sldMkLst>
+        <pc:spChg chg="del">
+          <ac:chgData name="Matthew Dunaway" userId="ecbf838ef16abdd7" providerId="LiveId" clId="{2D4C39F9-B3DF-480B-87DA-EF751013159C}" dt="2024-07-12T08:59:32.880" v="5" actId="478"/>
+          <ac:spMkLst>
+            <pc:docMk/>
+            <pc:sldMk cId="1648931339" sldId="257"/>
+            <ac:spMk id="15" creationId="{3F86F1B3-2A33-93FE-8A7E-2A73F6277411}"/>
+          </ac:spMkLst>
+        </pc:spChg>
+      </pc:sldChg>
+      <pc:sldChg chg="addSp delSp modSp add mod">
+        <pc:chgData name="Matthew Dunaway" userId="ecbf838ef16abdd7" providerId="LiveId" clId="{2D4C39F9-B3DF-480B-87DA-EF751013159C}" dt="2024-07-12T08:39:36.394" v="4" actId="732"/>
+        <pc:sldMkLst>
+          <pc:docMk/>
+          <pc:sldMk cId="1831709985" sldId="260"/>
+        </pc:sldMkLst>
+        <pc:picChg chg="add mod modCrop">
+          <ac:chgData name="Matthew Dunaway" userId="ecbf838ef16abdd7" providerId="LiveId" clId="{2D4C39F9-B3DF-480B-87DA-EF751013159C}" dt="2024-07-12T08:39:36.394" v="4" actId="732"/>
+          <ac:picMkLst>
+            <pc:docMk/>
+            <pc:sldMk cId="1831709985" sldId="260"/>
+            <ac:picMk id="3" creationId="{1E8B1610-FB5E-E57A-994B-5940DDB5ECC2}"/>
+          </ac:picMkLst>
+        </pc:picChg>
+        <pc:picChg chg="del">
+          <ac:chgData name="Matthew Dunaway" userId="ecbf838ef16abdd7" providerId="LiveId" clId="{2D4C39F9-B3DF-480B-87DA-EF751013159C}" dt="2024-07-12T08:38:37.515" v="1" actId="478"/>
+          <ac:picMkLst>
+            <pc:docMk/>
+            <pc:sldMk cId="1831709985" sldId="260"/>
+            <ac:picMk id="21" creationId="{2934B9DF-4CBB-198C-80BB-62DA7BD9344F}"/>
+          </ac:picMkLst>
+        </pc:picChg>
+      </pc:sldChg>
+      <pc:sldChg chg="delSp add mod">
+        <pc:chgData name="Matthew Dunaway" userId="ecbf838ef16abdd7" providerId="LiveId" clId="{2D4C39F9-B3DF-480B-87DA-EF751013159C}" dt="2024-07-12T09:08:26.203" v="7" actId="478"/>
+        <pc:sldMkLst>
+          <pc:docMk/>
+          <pc:sldMk cId="3940557259" sldId="261"/>
+        </pc:sldMkLst>
+        <pc:picChg chg="del">
+          <ac:chgData name="Matthew Dunaway" userId="ecbf838ef16abdd7" providerId="LiveId" clId="{2D4C39F9-B3DF-480B-87DA-EF751013159C}" dt="2024-07-12T09:08:26.203" v="7" actId="478"/>
+          <ac:picMkLst>
+            <pc:docMk/>
+            <pc:sldMk cId="3940557259" sldId="261"/>
+            <ac:picMk id="8" creationId="{016EA46B-48F5-75EA-0843-8CF6603B7E68}"/>
+          </ac:picMkLst>
+        </pc:picChg>
+      </pc:sldChg>
+    </pc:docChg>
+  </pc:docChgLst>
 </pc:chgInfo>
 </file>
 
@@ -369,7 +425,7 @@
           <a:p>
             <a:fld id="{600FE54C-63E0-4A2E-921F-C92B651F3C34}" type="datetimeFigureOut">
               <a:rPr lang="en-US" smtClean="0"/>
-              <a:t>7/7/2024</a:t>
+              <a:t>7/12/2024</a:t>
             </a:fld>
             <a:endParaRPr lang="en-US"/>
           </a:p>
@@ -539,7 +595,7 @@
           <a:p>
             <a:fld id="{600FE54C-63E0-4A2E-921F-C92B651F3C34}" type="datetimeFigureOut">
               <a:rPr lang="en-US" smtClean="0"/>
-              <a:t>7/7/2024</a:t>
+              <a:t>7/12/2024</a:t>
             </a:fld>
             <a:endParaRPr lang="en-US"/>
           </a:p>
@@ -719,7 +775,7 @@
           <a:p>
             <a:fld id="{600FE54C-63E0-4A2E-921F-C92B651F3C34}" type="datetimeFigureOut">
               <a:rPr lang="en-US" smtClean="0"/>
-              <a:t>7/7/2024</a:t>
+              <a:t>7/12/2024</a:t>
             </a:fld>
             <a:endParaRPr lang="en-US"/>
           </a:p>
@@ -889,7 +945,7 @@
           <a:p>
             <a:fld id="{600FE54C-63E0-4A2E-921F-C92B651F3C34}" type="datetimeFigureOut">
               <a:rPr lang="en-US" smtClean="0"/>
-              <a:t>7/7/2024</a:t>
+              <a:t>7/12/2024</a:t>
             </a:fld>
             <a:endParaRPr lang="en-US"/>
           </a:p>
@@ -1135,7 +1191,7 @@
           <a:p>
             <a:fld id="{600FE54C-63E0-4A2E-921F-C92B651F3C34}" type="datetimeFigureOut">
               <a:rPr lang="en-US" smtClean="0"/>
-              <a:t>7/7/2024</a:t>
+              <a:t>7/12/2024</a:t>
             </a:fld>
             <a:endParaRPr lang="en-US"/>
           </a:p>
@@ -1367,7 +1423,7 @@
           <a:p>
             <a:fld id="{600FE54C-63E0-4A2E-921F-C92B651F3C34}" type="datetimeFigureOut">
               <a:rPr lang="en-US" smtClean="0"/>
-              <a:t>7/7/2024</a:t>
+              <a:t>7/12/2024</a:t>
             </a:fld>
             <a:endParaRPr lang="en-US"/>
           </a:p>
@@ -1734,7 +1790,7 @@
           <a:p>
             <a:fld id="{600FE54C-63E0-4A2E-921F-C92B651F3C34}" type="datetimeFigureOut">
               <a:rPr lang="en-US" smtClean="0"/>
-              <a:t>7/7/2024</a:t>
+              <a:t>7/12/2024</a:t>
             </a:fld>
             <a:endParaRPr lang="en-US"/>
           </a:p>
@@ -1852,7 +1908,7 @@
           <a:p>
             <a:fld id="{600FE54C-63E0-4A2E-921F-C92B651F3C34}" type="datetimeFigureOut">
               <a:rPr lang="en-US" smtClean="0"/>
-              <a:t>7/7/2024</a:t>
+              <a:t>7/12/2024</a:t>
             </a:fld>
             <a:endParaRPr lang="en-US"/>
           </a:p>
@@ -1947,7 +2003,7 @@
           <a:p>
             <a:fld id="{600FE54C-63E0-4A2E-921F-C92B651F3C34}" type="datetimeFigureOut">
               <a:rPr lang="en-US" smtClean="0"/>
-              <a:t>7/7/2024</a:t>
+              <a:t>7/12/2024</a:t>
             </a:fld>
             <a:endParaRPr lang="en-US"/>
           </a:p>
@@ -2224,7 +2280,7 @@
           <a:p>
             <a:fld id="{600FE54C-63E0-4A2E-921F-C92B651F3C34}" type="datetimeFigureOut">
               <a:rPr lang="en-US" smtClean="0"/>
-              <a:t>7/7/2024</a:t>
+              <a:t>7/12/2024</a:t>
             </a:fld>
             <a:endParaRPr lang="en-US"/>
           </a:p>
@@ -2481,7 +2537,7 @@
           <a:p>
             <a:fld id="{600FE54C-63E0-4A2E-921F-C92B651F3C34}" type="datetimeFigureOut">
               <a:rPr lang="en-US" smtClean="0"/>
-              <a:t>7/7/2024</a:t>
+              <a:t>7/12/2024</a:t>
             </a:fld>
             <a:endParaRPr lang="en-US"/>
           </a:p>
@@ -2694,7 +2750,7 @@
           <a:p>
             <a:fld id="{600FE54C-63E0-4A2E-921F-C92B651F3C34}" type="datetimeFigureOut">
               <a:rPr lang="en-US" smtClean="0"/>
-              <a:t>7/7/2024</a:t>
+              <a:t>7/12/2024</a:t>
             </a:fld>
             <a:endParaRPr lang="en-US"/>
           </a:p>
@@ -3311,6 +3367,208 @@
       </p:grpSpPr>
       <p:pic>
         <p:nvPicPr>
+          <p:cNvPr id="25" name="Picture 24">
+            <a:extLst>
+              <a:ext uri="{FF2B5EF4-FFF2-40B4-BE49-F238E27FC236}">
+                <a16:creationId xmlns:a16="http://schemas.microsoft.com/office/drawing/2014/main" id="{B0D9E1A0-8E18-A71F-5F58-A83137B8BB4D}"/>
+              </a:ext>
+            </a:extLst>
+          </p:cNvPr>
+          <p:cNvPicPr>
+            <a:picLocks noChangeAspect="1"/>
+          </p:cNvPicPr>
+          <p:nvPr/>
+        </p:nvPicPr>
+        <p:blipFill>
+          <a:blip r:embed="rId2"/>
+          <a:stretch>
+            <a:fillRect/>
+          </a:stretch>
+        </p:blipFill>
+        <p:spPr>
+          <a:xfrm>
+            <a:off x="183696" y="152232"/>
+            <a:ext cx="11843658" cy="6553536"/>
+          </a:xfrm>
+          <a:prstGeom prst="rect">
+            <a:avLst/>
+          </a:prstGeom>
+        </p:spPr>
+      </p:pic>
+      <p:pic>
+        <p:nvPicPr>
+          <p:cNvPr id="7" name="Picture 6">
+            <a:extLst>
+              <a:ext uri="{FF2B5EF4-FFF2-40B4-BE49-F238E27FC236}">
+                <a16:creationId xmlns:a16="http://schemas.microsoft.com/office/drawing/2014/main" id="{6969AD01-4A0B-21B4-8670-585EA55A3FEB}"/>
+              </a:ext>
+            </a:extLst>
+          </p:cNvPr>
+          <p:cNvPicPr>
+            <a:picLocks noChangeAspect="1"/>
+          </p:cNvPicPr>
+          <p:nvPr/>
+        </p:nvPicPr>
+        <p:blipFill>
+          <a:blip r:embed="rId3"/>
+          <a:stretch>
+            <a:fillRect/>
+          </a:stretch>
+        </p:blipFill>
+        <p:spPr>
+          <a:xfrm>
+            <a:off x="198984" y="333733"/>
+            <a:ext cx="11818845" cy="168173"/>
+          </a:xfrm>
+          <a:prstGeom prst="rect">
+            <a:avLst/>
+          </a:prstGeom>
+          <a:effectLst>
+            <a:glow rad="76200">
+              <a:srgbClr val="FFFF00">
+                <a:alpha val="95000"/>
+              </a:srgbClr>
+            </a:glow>
+          </a:effectLst>
+        </p:spPr>
+      </p:pic>
+      <p:pic>
+        <p:nvPicPr>
+          <p:cNvPr id="12" name="Picture 11">
+            <a:extLst>
+              <a:ext uri="{FF2B5EF4-FFF2-40B4-BE49-F238E27FC236}">
+                <a16:creationId xmlns:a16="http://schemas.microsoft.com/office/drawing/2014/main" id="{2AE29343-80C9-8F8B-8580-DC6807DB2761}"/>
+              </a:ext>
+            </a:extLst>
+          </p:cNvPr>
+          <p:cNvPicPr>
+            <a:picLocks noChangeAspect="1"/>
+          </p:cNvPicPr>
+          <p:nvPr/>
+        </p:nvPicPr>
+        <p:blipFill>
+          <a:blip r:embed="rId4"/>
+          <a:stretch>
+            <a:fillRect/>
+          </a:stretch>
+        </p:blipFill>
+        <p:spPr>
+          <a:xfrm>
+            <a:off x="245639" y="2417968"/>
+            <a:ext cx="1556948" cy="1650179"/>
+          </a:xfrm>
+          <a:prstGeom prst="rect">
+            <a:avLst/>
+          </a:prstGeom>
+          <a:effectLst>
+            <a:glow rad="76200">
+              <a:schemeClr val="accent6">
+                <a:satMod val="175000"/>
+                <a:alpha val="95000"/>
+              </a:schemeClr>
+            </a:glow>
+          </a:effectLst>
+        </p:spPr>
+      </p:pic>
+      <p:pic>
+        <p:nvPicPr>
+          <p:cNvPr id="14" name="Picture 13">
+            <a:extLst>
+              <a:ext uri="{FF2B5EF4-FFF2-40B4-BE49-F238E27FC236}">
+                <a16:creationId xmlns:a16="http://schemas.microsoft.com/office/drawing/2014/main" id="{FFE08C4B-D13C-5431-0497-B696690C4B58}"/>
+              </a:ext>
+            </a:extLst>
+          </p:cNvPr>
+          <p:cNvPicPr>
+            <a:picLocks noChangeAspect="1"/>
+          </p:cNvPicPr>
+          <p:nvPr/>
+        </p:nvPicPr>
+        <p:blipFill>
+          <a:blip r:embed="rId5"/>
+          <a:stretch>
+            <a:fillRect/>
+          </a:stretch>
+        </p:blipFill>
+        <p:spPr>
+          <a:xfrm>
+            <a:off x="245639" y="564575"/>
+            <a:ext cx="1541052" cy="1777409"/>
+          </a:xfrm>
+          <a:prstGeom prst="rect">
+            <a:avLst/>
+          </a:prstGeom>
+          <a:effectLst>
+            <a:glow rad="76200">
+              <a:schemeClr val="accent4">
+                <a:satMod val="175000"/>
+                <a:alpha val="95000"/>
+              </a:schemeClr>
+            </a:glow>
+          </a:effectLst>
+        </p:spPr>
+      </p:pic>
+      <p:pic>
+        <p:nvPicPr>
+          <p:cNvPr id="3" name="Picture 2">
+            <a:extLst>
+              <a:ext uri="{FF2B5EF4-FFF2-40B4-BE49-F238E27FC236}">
+                <a16:creationId xmlns:a16="http://schemas.microsoft.com/office/drawing/2014/main" id="{1E8B1610-FB5E-E57A-994B-5940DDB5ECC2}"/>
+              </a:ext>
+            </a:extLst>
+          </p:cNvPr>
+          <p:cNvPicPr>
+            <a:picLocks noChangeAspect="1"/>
+          </p:cNvPicPr>
+          <p:nvPr/>
+        </p:nvPicPr>
+        <p:blipFill rotWithShape="1">
+          <a:blip r:embed="rId6"/>
+          <a:srcRect r="84932"/>
+          <a:stretch/>
+        </p:blipFill>
+        <p:spPr>
+          <a:xfrm>
+            <a:off x="1915933" y="4985152"/>
+            <a:ext cx="1485636" cy="600159"/>
+          </a:xfrm>
+          <a:prstGeom prst="rect">
+            <a:avLst/>
+          </a:prstGeom>
+        </p:spPr>
+      </p:pic>
+    </p:spTree>
+    <p:extLst>
+      <p:ext uri="{BB962C8B-B14F-4D97-AF65-F5344CB8AC3E}">
+        <p14:creationId xmlns:p14="http://schemas.microsoft.com/office/powerpoint/2010/main" val="1831709985"/>
+      </p:ext>
+    </p:extLst>
+  </p:cSld>
+  <p:clrMapOvr>
+    <a:masterClrMapping/>
+  </p:clrMapOvr>
+</p:sld>
+</file>
+
+<file path=ppt/slides/slide3.xml><?xml version="1.0" encoding="utf-8"?>
+<p:sld xmlns:a="http://schemas.openxmlformats.org/drawingml/2006/main" xmlns:r="http://schemas.openxmlformats.org/officeDocument/2006/relationships" xmlns:p="http://schemas.openxmlformats.org/presentationml/2006/main">
+  <p:cSld>
+    <p:spTree>
+      <p:nvGrpSpPr>
+        <p:cNvPr id="1" name=""/>
+        <p:cNvGrpSpPr/>
+        <p:nvPr/>
+      </p:nvGrpSpPr>
+      <p:grpSpPr>
+        <a:xfrm>
+          <a:off x="0" y="0"/>
+          <a:ext cx="0" cy="0"/>
+          <a:chOff x="0" y="0"/>
+          <a:chExt cx="0" cy="0"/>
+        </a:xfrm>
+      </p:grpSpPr>
+      <p:pic>
+        <p:nvPicPr>
           <p:cNvPr id="3" name="Picture 2">
             <a:extLst>
               <a:ext uri="{FF2B5EF4-FFF2-40B4-BE49-F238E27FC236}">
@@ -3339,81 +3597,6 @@
           </a:prstGeom>
         </p:spPr>
       </p:pic>
-      <p:sp>
-        <p:nvSpPr>
-          <p:cNvPr id="15" name="Rectangle: Rounded Corners 14">
-            <a:extLst>
-              <a:ext uri="{FF2B5EF4-FFF2-40B4-BE49-F238E27FC236}">
-                <a16:creationId xmlns:a16="http://schemas.microsoft.com/office/drawing/2014/main" id="{3F86F1B3-2A33-93FE-8A7E-2A73F6277411}"/>
-              </a:ext>
-            </a:extLst>
-          </p:cNvPr>
-          <p:cNvSpPr/>
-          <p:nvPr/>
-        </p:nvSpPr>
-        <p:spPr>
-          <a:xfrm>
-            <a:off x="531845" y="5534026"/>
-            <a:ext cx="11159414" cy="743574"/>
-          </a:xfrm>
-          <a:prstGeom prst="roundRect">
-            <a:avLst/>
-          </a:prstGeom>
-          <a:noFill/>
-          <a:ln>
-            <a:solidFill>
-              <a:schemeClr val="tx2">
-                <a:lumMod val="90000"/>
-              </a:schemeClr>
-            </a:solidFill>
-          </a:ln>
-        </p:spPr>
-        <p:style>
-          <a:lnRef idx="2">
-            <a:schemeClr val="accent1">
-              <a:shade val="15000"/>
-            </a:schemeClr>
-          </a:lnRef>
-          <a:fillRef idx="1">
-            <a:schemeClr val="accent1"/>
-          </a:fillRef>
-          <a:effectRef idx="0">
-            <a:schemeClr val="accent1"/>
-          </a:effectRef>
-          <a:fontRef idx="minor">
-            <a:schemeClr val="lt1"/>
-          </a:fontRef>
-        </p:style>
-        <p:txBody>
-          <a:bodyPr numCol="1" rtlCol="0" anchor="ctr"/>
-          <a:lstStyle/>
-          <a:p>
-            <a:pPr algn="ctr"/>
-            <a:r>
-              <a:rPr lang="en-US" sz="1400" dirty="0">
-                <a:solidFill>
-                  <a:srgbClr val="FFFF00"/>
-                </a:solidFill>
-              </a:rPr>
-              <a:t>Personnel Role Matrix</a:t>
-            </a:r>
-          </a:p>
-          <a:p>
-            <a:pPr algn="ctr"/>
-            <a:r>
-              <a:rPr lang="en-US" sz="1400" dirty="0">
-                <a:solidFill>
-                  <a:schemeClr val="accent5">
-                    <a:lumMod val="60000"/>
-                    <a:lumOff val="40000"/>
-                  </a:schemeClr>
-                </a:solidFill>
-              </a:rPr>
-              <a:t>Assignment Code Legend</a:t>
-            </a:r>
-          </a:p>
-        </p:txBody>
-      </p:sp>
       <p:pic>
         <p:nvPicPr>
           <p:cNvPr id="5" name="Picture 4">
@@ -3502,7 +3685,105 @@
 </p:sld>
 </file>
 
-<file path=ppt/slides/slide3.xml><?xml version="1.0" encoding="utf-8"?>
+<file path=ppt/slides/slide4.xml><?xml version="1.0" encoding="utf-8"?>
+<p:sld xmlns:a="http://schemas.openxmlformats.org/drawingml/2006/main" xmlns:r="http://schemas.openxmlformats.org/officeDocument/2006/relationships" xmlns:p="http://schemas.openxmlformats.org/presentationml/2006/main">
+  <p:cSld>
+    <p:spTree>
+      <p:nvGrpSpPr>
+        <p:cNvPr id="1" name=""/>
+        <p:cNvGrpSpPr/>
+        <p:nvPr/>
+      </p:nvGrpSpPr>
+      <p:grpSpPr>
+        <a:xfrm>
+          <a:off x="0" y="0"/>
+          <a:ext cx="0" cy="0"/>
+          <a:chOff x="0" y="0"/>
+          <a:chExt cx="0" cy="0"/>
+        </a:xfrm>
+      </p:grpSpPr>
+      <p:pic>
+        <p:nvPicPr>
+          <p:cNvPr id="3" name="Picture 2">
+            <a:extLst>
+              <a:ext uri="{FF2B5EF4-FFF2-40B4-BE49-F238E27FC236}">
+                <a16:creationId xmlns:a16="http://schemas.microsoft.com/office/drawing/2014/main" id="{A9ECC67D-A052-9076-2E18-5BCA311016D2}"/>
+              </a:ext>
+            </a:extLst>
+          </p:cNvPr>
+          <p:cNvPicPr>
+            <a:picLocks noChangeAspect="1"/>
+          </p:cNvPicPr>
+          <p:nvPr/>
+        </p:nvPicPr>
+        <p:blipFill>
+          <a:blip r:embed="rId2"/>
+          <a:stretch>
+            <a:fillRect/>
+          </a:stretch>
+        </p:blipFill>
+        <p:spPr>
+          <a:xfrm>
+            <a:off x="180975" y="155997"/>
+            <a:ext cx="11830050" cy="6546006"/>
+          </a:xfrm>
+          <a:prstGeom prst="rect">
+            <a:avLst/>
+          </a:prstGeom>
+        </p:spPr>
+      </p:pic>
+      <p:pic>
+        <p:nvPicPr>
+          <p:cNvPr id="5" name="Picture 4">
+            <a:extLst>
+              <a:ext uri="{FF2B5EF4-FFF2-40B4-BE49-F238E27FC236}">
+                <a16:creationId xmlns:a16="http://schemas.microsoft.com/office/drawing/2014/main" id="{97AD8595-BDC0-43E0-E0B9-838CEACFB7F0}"/>
+              </a:ext>
+            </a:extLst>
+          </p:cNvPr>
+          <p:cNvPicPr>
+            <a:picLocks noChangeAspect="1"/>
+          </p:cNvPicPr>
+          <p:nvPr/>
+        </p:nvPicPr>
+        <p:blipFill>
+          <a:blip r:embed="rId3"/>
+          <a:stretch>
+            <a:fillRect/>
+          </a:stretch>
+        </p:blipFill>
+        <p:spPr>
+          <a:xfrm>
+            <a:off x="2080701" y="3394752"/>
+            <a:ext cx="7329999" cy="2039818"/>
+          </a:xfrm>
+          <a:prstGeom prst="rect">
+            <a:avLst/>
+          </a:prstGeom>
+          <a:effectLst>
+            <a:glow rad="76200">
+              <a:schemeClr val="accent5">
+                <a:satMod val="175000"/>
+                <a:alpha val="95000"/>
+              </a:schemeClr>
+            </a:glow>
+          </a:effectLst>
+        </p:spPr>
+      </p:pic>
+    </p:spTree>
+    <p:extLst>
+      <p:ext uri="{BB962C8B-B14F-4D97-AF65-F5344CB8AC3E}">
+        <p14:creationId xmlns:p14="http://schemas.microsoft.com/office/powerpoint/2010/main" val="3940557259"/>
+      </p:ext>
+    </p:extLst>
+  </p:cSld>
+  <p:clrMapOvr>
+    <a:masterClrMapping/>
+  </p:clrMapOvr>
+</p:sld>
+</file>
+
+<file path=ppt/slides/slide5.xml><?xml version="1.0" encoding="utf-8"?>
 <p:sld xmlns:a="http://schemas.openxmlformats.org/drawingml/2006/main" xmlns:r="http://schemas.openxmlformats.org/officeDocument/2006/relationships" xmlns:p="http://schemas.openxmlformats.org/presentationml/2006/main">
   <p:cSld>
     <p:spTree>
@@ -3650,7 +3931,7 @@
 </p:sld>
 </file>
 
-<file path=ppt/slides/slide4.xml><?xml version="1.0" encoding="utf-8"?>
+<file path=ppt/slides/slide6.xml><?xml version="1.0" encoding="utf-8"?>
 <p:sld xmlns:a="http://schemas.openxmlformats.org/drawingml/2006/main" xmlns:r="http://schemas.openxmlformats.org/officeDocument/2006/relationships" xmlns:p="http://schemas.openxmlformats.org/presentationml/2006/main">
   <p:cSld>
     <p:spTree>

</xml_diff>